<commit_message>
Fix: save the slide after ReplaceTag()
</commit_message>
<xml_diff>
--- a/PptxTemplater.Tests/files/ReplacePicturesInAllSlides.pptx
+++ b/PptxTemplater.Tests/files/ReplacePicturesInAllSlides.pptx
@@ -289,7 +289,7 @@
           <a:p>
             <a:fld id="{2FEA1274-F16B-41BC-8EDC-C9BDBE8EC8FC}" type="datetimeFigureOut">
               <a:rPr lang="fr-FR" smtClean="0"/>
-              <a:t>14/09/2012</a:t>
+              <a:t>20/09/2012</a:t>
             </a:fld>
             <a:endParaRPr lang="fr-FR"/>
           </a:p>
@@ -459,7 +459,7 @@
           <a:p>
             <a:fld id="{2FEA1274-F16B-41BC-8EDC-C9BDBE8EC8FC}" type="datetimeFigureOut">
               <a:rPr lang="fr-FR" smtClean="0"/>
-              <a:t>14/09/2012</a:t>
+              <a:t>20/09/2012</a:t>
             </a:fld>
             <a:endParaRPr lang="fr-FR"/>
           </a:p>
@@ -639,7 +639,7 @@
           <a:p>
             <a:fld id="{2FEA1274-F16B-41BC-8EDC-C9BDBE8EC8FC}" type="datetimeFigureOut">
               <a:rPr lang="fr-FR" smtClean="0"/>
-              <a:t>14/09/2012</a:t>
+              <a:t>20/09/2012</a:t>
             </a:fld>
             <a:endParaRPr lang="fr-FR"/>
           </a:p>
@@ -809,7 +809,7 @@
           <a:p>
             <a:fld id="{2FEA1274-F16B-41BC-8EDC-C9BDBE8EC8FC}" type="datetimeFigureOut">
               <a:rPr lang="fr-FR" smtClean="0"/>
-              <a:t>14/09/2012</a:t>
+              <a:t>20/09/2012</a:t>
             </a:fld>
             <a:endParaRPr lang="fr-FR"/>
           </a:p>
@@ -1055,7 +1055,7 @@
           <a:p>
             <a:fld id="{2FEA1274-F16B-41BC-8EDC-C9BDBE8EC8FC}" type="datetimeFigureOut">
               <a:rPr lang="fr-FR" smtClean="0"/>
-              <a:t>14/09/2012</a:t>
+              <a:t>20/09/2012</a:t>
             </a:fld>
             <a:endParaRPr lang="fr-FR"/>
           </a:p>
@@ -1343,7 +1343,7 @@
           <a:p>
             <a:fld id="{2FEA1274-F16B-41BC-8EDC-C9BDBE8EC8FC}" type="datetimeFigureOut">
               <a:rPr lang="fr-FR" smtClean="0"/>
-              <a:t>14/09/2012</a:t>
+              <a:t>20/09/2012</a:t>
             </a:fld>
             <a:endParaRPr lang="fr-FR"/>
           </a:p>
@@ -1765,7 +1765,7 @@
           <a:p>
             <a:fld id="{2FEA1274-F16B-41BC-8EDC-C9BDBE8EC8FC}" type="datetimeFigureOut">
               <a:rPr lang="fr-FR" smtClean="0"/>
-              <a:t>14/09/2012</a:t>
+              <a:t>20/09/2012</a:t>
             </a:fld>
             <a:endParaRPr lang="fr-FR"/>
           </a:p>
@@ -1883,7 +1883,7 @@
           <a:p>
             <a:fld id="{2FEA1274-F16B-41BC-8EDC-C9BDBE8EC8FC}" type="datetimeFigureOut">
               <a:rPr lang="fr-FR" smtClean="0"/>
-              <a:t>14/09/2012</a:t>
+              <a:t>20/09/2012</a:t>
             </a:fld>
             <a:endParaRPr lang="fr-FR"/>
           </a:p>
@@ -1978,7 +1978,7 @@
           <a:p>
             <a:fld id="{2FEA1274-F16B-41BC-8EDC-C9BDBE8EC8FC}" type="datetimeFigureOut">
               <a:rPr lang="fr-FR" smtClean="0"/>
-              <a:t>14/09/2012</a:t>
+              <a:t>20/09/2012</a:t>
             </a:fld>
             <a:endParaRPr lang="fr-FR"/>
           </a:p>
@@ -2255,7 +2255,7 @@
           <a:p>
             <a:fld id="{2FEA1274-F16B-41BC-8EDC-C9BDBE8EC8FC}" type="datetimeFigureOut">
               <a:rPr lang="fr-FR" smtClean="0"/>
-              <a:t>14/09/2012</a:t>
+              <a:t>20/09/2012</a:t>
             </a:fld>
             <a:endParaRPr lang="fr-FR"/>
           </a:p>
@@ -2508,7 +2508,7 @@
           <a:p>
             <a:fld id="{2FEA1274-F16B-41BC-8EDC-C9BDBE8EC8FC}" type="datetimeFigureOut">
               <a:rPr lang="fr-FR" smtClean="0"/>
-              <a:t>14/09/2012</a:t>
+              <a:t>20/09/2012</a:t>
             </a:fld>
             <a:endParaRPr lang="fr-FR"/>
           </a:p>
@@ -2721,7 +2721,7 @@
           <a:p>
             <a:fld id="{2FEA1274-F16B-41BC-8EDC-C9BDBE8EC8FC}" type="datetimeFigureOut">
               <a:rPr lang="fr-FR" smtClean="0"/>
-              <a:t>14/09/2012</a:t>
+              <a:t>20/09/2012</a:t>
             </a:fld>
             <a:endParaRPr lang="fr-FR"/>
           </a:p>
@@ -3576,6 +3576,77 @@
           </a:prstGeom>
         </p:spPr>
       </p:pic>
+      <p:sp>
+        <p:nvSpPr>
+          <p:cNvPr id="2" name="Rectangle 1"/>
+          <p:cNvSpPr/>
+          <p:nvPr/>
+        </p:nvSpPr>
+        <p:spPr>
+          <a:xfrm>
+            <a:off x="3286232" y="2967335"/>
+            <a:ext cx="2571538" cy="923330"/>
+          </a:xfrm>
+          <a:prstGeom prst="rect">
+            <a:avLst/>
+          </a:prstGeom>
+          <a:noFill/>
+        </p:spPr>
+        <p:txBody>
+          <a:bodyPr wrap="none" lIns="91440" tIns="45720" rIns="91440" bIns="45720">
+            <a:spAutoFit/>
+          </a:bodyPr>
+          <a:lstStyle/>
+          <a:p>
+            <a:pPr algn="ctr"/>
+            <a:r>
+              <a:rPr lang="en-US" sz="5400" b="1" dirty="0" smtClean="0">
+                <a:ln w="19050">
+                  <a:solidFill>
+                    <a:schemeClr val="tx2">
+                      <a:tint val="1000"/>
+                    </a:schemeClr>
+                  </a:solidFill>
+                  <a:prstDash val="solid"/>
+                </a:ln>
+                <a:solidFill>
+                  <a:schemeClr val="accent3"/>
+                </a:solidFill>
+                <a:effectLst>
+                  <a:outerShdw blurRad="50000" dist="50800" dir="7500000" algn="tl">
+                    <a:srgbClr val="000000">
+                      <a:shade val="5000"/>
+                      <a:alpha val="35000"/>
+                    </a:srgbClr>
+                  </a:outerShdw>
+                </a:effectLst>
+              </a:rPr>
+              <a:t>{{hello}}</a:t>
+            </a:r>
+            <a:endParaRPr lang="fr-FR" sz="5400" b="1" cap="none" spc="0" dirty="0">
+              <a:ln w="19050">
+                <a:solidFill>
+                  <a:schemeClr val="tx2">
+                    <a:tint val="1000"/>
+                  </a:schemeClr>
+                </a:solidFill>
+                <a:prstDash val="solid"/>
+              </a:ln>
+              <a:solidFill>
+                <a:schemeClr val="accent3"/>
+              </a:solidFill>
+              <a:effectLst>
+                <a:outerShdw blurRad="50000" dist="50800" dir="7500000" algn="tl">
+                  <a:srgbClr val="000000">
+                    <a:shade val="5000"/>
+                    <a:alpha val="35000"/>
+                  </a:srgbClr>
+                </a:outerShdw>
+              </a:effectLst>
+            </a:endParaRPr>
+          </a:p>
+        </p:txBody>
+      </p:sp>
     </p:spTree>
     <p:extLst>
       <p:ext uri="{BB962C8B-B14F-4D97-AF65-F5344CB8AC3E}">

</xml_diff>